<commit_message>
Updated master PPT file template
</commit_message>
<xml_diff>
--- a/Work Packages/WP9 Outreach and communication/templates/PaNOSC_ PowerPoint template.pptx
+++ b/Work Packages/WP9 Outreach and communication/templates/PaNOSC_ PowerPoint template.pptx
@@ -7,6 +7,9 @@
   <p:notesMasterIdLst>
     <p:notesMasterId r:id="rId4"/>
   </p:notesMasterIdLst>
+  <p:handoutMasterIdLst>
+    <p:handoutMasterId r:id="rId5"/>
+  </p:handoutMasterIdLst>
   <p:sldIdLst>
     <p:sldId id="268" r:id="rId2"/>
     <p:sldId id="284" r:id="rId3"/>
@@ -211,6 +214,171 @@
 </p:presentation>
 </file>
 
+<file path=ppt/handoutMasters/handoutMaster1.xml><?xml version="1.0" encoding="utf-8"?>
+<p:handoutMaster xmlns:a="http://schemas.openxmlformats.org/drawingml/2006/main" xmlns:r="http://schemas.openxmlformats.org/officeDocument/2006/relationships" xmlns:p="http://schemas.openxmlformats.org/presentationml/2006/main">
+  <p:cSld>
+    <p:bg>
+      <p:bgRef idx="1001">
+        <a:schemeClr val="bg1"/>
+      </p:bgRef>
+    </p:bg>
+    <p:spTree>
+      <p:nvGrpSpPr>
+        <p:cNvPr id="1" name=""/>
+        <p:cNvGrpSpPr/>
+        <p:nvPr/>
+      </p:nvGrpSpPr>
+      <p:grpSpPr>
+        <a:xfrm>
+          <a:off x="0" y="0"/>
+          <a:ext cx="0" cy="0"/>
+          <a:chOff x="0" y="0"/>
+          <a:chExt cx="0" cy="0"/>
+        </a:xfrm>
+      </p:grpSpPr>
+      <p:sp>
+        <p:nvSpPr>
+          <p:cNvPr id="2" name="Header Placeholder 1"/>
+          <p:cNvSpPr>
+            <a:spLocks noGrp="1"/>
+          </p:cNvSpPr>
+          <p:nvPr>
+            <p:ph type="hdr" sz="quarter"/>
+          </p:nvPr>
+        </p:nvSpPr>
+        <p:spPr>
+          <a:xfrm>
+            <a:off x="0" y="0"/>
+            <a:ext cx="2971800" cy="458788"/>
+          </a:xfrm>
+          <a:prstGeom prst="rect">
+            <a:avLst/>
+          </a:prstGeom>
+        </p:spPr>
+        <p:txBody>
+          <a:bodyPr vert="horz" lIns="91440" tIns="45720" rIns="91440" bIns="45720" rtlCol="0"/>
+          <a:lstStyle>
+            <a:lvl1pPr algn="l">
+              <a:defRPr sz="1200"/>
+            </a:lvl1pPr>
+          </a:lstStyle>
+          <a:p>
+            <a:endParaRPr lang="en-GB"/>
+          </a:p>
+        </p:txBody>
+      </p:sp>
+      <p:sp>
+        <p:nvSpPr>
+          <p:cNvPr id="3" name="Date Placeholder 2"/>
+          <p:cNvSpPr>
+            <a:spLocks noGrp="1"/>
+          </p:cNvSpPr>
+          <p:nvPr>
+            <p:ph type="dt" sz="quarter" idx="1"/>
+          </p:nvPr>
+        </p:nvSpPr>
+        <p:spPr>
+          <a:xfrm>
+            <a:off x="3884613" y="0"/>
+            <a:ext cx="2971800" cy="458788"/>
+          </a:xfrm>
+          <a:prstGeom prst="rect">
+            <a:avLst/>
+          </a:prstGeom>
+        </p:spPr>
+        <p:txBody>
+          <a:bodyPr vert="horz" lIns="91440" tIns="45720" rIns="91440" bIns="45720" rtlCol="0"/>
+          <a:lstStyle>
+            <a:lvl1pPr algn="r">
+              <a:defRPr sz="1200"/>
+            </a:lvl1pPr>
+          </a:lstStyle>
+          <a:p>
+            <a:fld id="{126A9F0B-EDFC-48AA-8FAD-E1EF1C8D8A78}" type="datetimeFigureOut">
+              <a:rPr lang="en-GB" smtClean="0"/>
+              <a:t>11/01/2019</a:t>
+            </a:fld>
+            <a:endParaRPr lang="en-GB"/>
+          </a:p>
+        </p:txBody>
+      </p:sp>
+      <p:sp>
+        <p:nvSpPr>
+          <p:cNvPr id="4" name="Footer Placeholder 3"/>
+          <p:cNvSpPr>
+            <a:spLocks noGrp="1"/>
+          </p:cNvSpPr>
+          <p:nvPr>
+            <p:ph type="ftr" sz="quarter" idx="2"/>
+          </p:nvPr>
+        </p:nvSpPr>
+        <p:spPr>
+          <a:xfrm>
+            <a:off x="0" y="8685213"/>
+            <a:ext cx="2971800" cy="458787"/>
+          </a:xfrm>
+          <a:prstGeom prst="rect">
+            <a:avLst/>
+          </a:prstGeom>
+        </p:spPr>
+        <p:txBody>
+          <a:bodyPr vert="horz" lIns="91440" tIns="45720" rIns="91440" bIns="45720" rtlCol="0" anchor="b"/>
+          <a:lstStyle>
+            <a:lvl1pPr algn="l">
+              <a:defRPr sz="1200"/>
+            </a:lvl1pPr>
+          </a:lstStyle>
+          <a:p>
+            <a:endParaRPr lang="en-GB"/>
+          </a:p>
+        </p:txBody>
+      </p:sp>
+      <p:sp>
+        <p:nvSpPr>
+          <p:cNvPr id="5" name="Slide Number Placeholder 4"/>
+          <p:cNvSpPr>
+            <a:spLocks noGrp="1"/>
+          </p:cNvSpPr>
+          <p:nvPr>
+            <p:ph type="sldNum" sz="quarter" idx="3"/>
+          </p:nvPr>
+        </p:nvSpPr>
+        <p:spPr>
+          <a:xfrm>
+            <a:off x="3884613" y="8685213"/>
+            <a:ext cx="2971800" cy="458787"/>
+          </a:xfrm>
+          <a:prstGeom prst="rect">
+            <a:avLst/>
+          </a:prstGeom>
+        </p:spPr>
+        <p:txBody>
+          <a:bodyPr vert="horz" lIns="91440" tIns="45720" rIns="91440" bIns="45720" rtlCol="0" anchor="b"/>
+          <a:lstStyle>
+            <a:lvl1pPr algn="r">
+              <a:defRPr sz="1200"/>
+            </a:lvl1pPr>
+          </a:lstStyle>
+          <a:p>
+            <a:fld id="{D4A30BA5-50BC-4FA8-B8FF-9B048DDA38E2}" type="slidenum">
+              <a:rPr lang="en-GB" smtClean="0"/>
+              <a:t>‹#›</a:t>
+            </a:fld>
+            <a:endParaRPr lang="en-GB"/>
+          </a:p>
+        </p:txBody>
+      </p:sp>
+    </p:spTree>
+    <p:extLst>
+      <p:ext uri="{BB962C8B-B14F-4D97-AF65-F5344CB8AC3E}">
+        <p14:creationId xmlns:p14="http://schemas.microsoft.com/office/powerpoint/2010/main" val="1271232748"/>
+      </p:ext>
+    </p:extLst>
+  </p:cSld>
+  <p:clrMap bg1="lt1" tx1="dk1" bg2="lt2" tx2="dk2" accent1="accent1" accent2="accent2" accent3="accent3" accent4="accent4" accent5="accent5" accent6="accent6" hlink="hlink" folHlink="folHlink"/>
+</p:handoutMaster>
+</file>
+
 <file path=ppt/notesMasters/notesMaster1.xml><?xml version="1.0" encoding="utf-8"?>
 <p:notesMaster xmlns:a="http://schemas.openxmlformats.org/drawingml/2006/main" xmlns:r="http://schemas.openxmlformats.org/officeDocument/2006/relationships" xmlns:p="http://schemas.openxmlformats.org/presentationml/2006/main">
   <p:cSld>
@@ -323,7 +491,7 @@
               <a:pPr>
                 <a:defRPr/>
               </a:pPr>
-              <a:t>10/01/2019</a:t>
+              <a:t>11/01/2019</a:t>
             </a:fld>
             <a:endParaRPr lang="fr-FR"/>
           </a:p>
@@ -1019,8 +1187,8 @@
               <a:defRPr/>
             </a:pPr>
             <a:r>
-              <a:rPr lang="en-US" smtClean="0"/>
-              <a:t>R Dimper – PaNOSC project – LEAPS meeting 13 November 2018 </a:t>
+              <a:rPr lang="en-US" dirty="0" smtClean="0"/>
+              <a:t>Author – Presentation title - date</a:t>
             </a:r>
             <a:endParaRPr lang="fr-FR" dirty="0"/>
           </a:p>
@@ -1063,6 +1231,45 @@
           </a:p>
         </p:txBody>
       </p:sp>
+      <p:pic>
+        <p:nvPicPr>
+          <p:cNvPr id="9" name="Picture 2" descr="https://lh5.googleusercontent.com/ZmJgH0SoqxQJ0LA-v3Rb7WqRt9KO5MW6Z34Oe3WUvt_3nWcLDwQpmnBxjSTv3sQreW90kJou3O_z01RBBIdgyCNf-_rXDm7Ive_nnmIearfz_GCdO9h5BUk63mDr-JE4FVu0qz41"/>
+          <p:cNvPicPr>
+            <a:picLocks noChangeAspect="1" noChangeArrowheads="1"/>
+          </p:cNvPicPr>
+          <p:nvPr userDrawn="1"/>
+        </p:nvPicPr>
+        <p:blipFill rotWithShape="1">
+          <a:blip r:embed="rId2" cstate="print">
+            <a:extLst>
+              <a:ext uri="{28A0092B-C50C-407E-A947-70E740481C1C}">
+                <a14:useLocalDpi xmlns:a14="http://schemas.microsoft.com/office/drawing/2010/main" val="0"/>
+              </a:ext>
+            </a:extLst>
+          </a:blip>
+          <a:srcRect l="247" r="491"/>
+          <a:stretch/>
+        </p:blipFill>
+        <p:spPr bwMode="auto">
+          <a:xfrm>
+            <a:off x="7722759" y="104513"/>
+            <a:ext cx="1239465" cy="450538"/>
+          </a:xfrm>
+          <a:prstGeom prst="rect">
+            <a:avLst/>
+          </a:prstGeom>
+          <a:noFill/>
+          <a:extLst>
+            <a:ext uri="{909E8E84-426E-40DD-AFC4-6F175D3DCCD1}">
+              <a14:hiddenFill xmlns:a14="http://schemas.microsoft.com/office/drawing/2010/main">
+                <a:solidFill>
+                  <a:srgbClr val="FFFFFF"/>
+                </a:solidFill>
+              </a14:hiddenFill>
+            </a:ext>
+          </a:extLst>
+        </p:spPr>
+      </p:pic>
     </p:spTree>
   </p:cSld>
   <p:clrMapOvr>
@@ -1106,7 +1313,12 @@
             <p:ph type="title"/>
           </p:nvPr>
         </p:nvSpPr>
-        <p:spPr bwMode="gray"/>
+        <p:spPr bwMode="gray">
+          <a:xfrm>
+            <a:off x="727075" y="104513"/>
+            <a:ext cx="6983777" cy="414073"/>
+          </a:xfrm>
+        </p:spPr>
         <p:txBody>
           <a:bodyPr/>
           <a:lstStyle>
@@ -1240,8 +1452,8 @@
               <a:defRPr/>
             </a:pPr>
             <a:r>
-              <a:rPr lang="en-US" smtClean="0"/>
-              <a:t>R Dimper – PaNOSC project – LEAPS meeting 13 November 2018 </a:t>
+              <a:rPr lang="en-US" dirty="0" smtClean="0"/>
+              <a:t>Author – Presentation title - date</a:t>
             </a:r>
             <a:endParaRPr lang="fr-FR" dirty="0"/>
           </a:p>
@@ -1373,8 +1585,8 @@
               <a:defRPr/>
             </a:pPr>
             <a:r>
-              <a:rPr lang="en-US" smtClean="0"/>
-              <a:t>R Dimper – PaNOSC project – LEAPS meeting 13 November 2018 </a:t>
+              <a:rPr lang="en-US" dirty="0" smtClean="0"/>
+              <a:t>Author – Presentation title - date</a:t>
             </a:r>
             <a:endParaRPr lang="fr-FR" dirty="0"/>
           </a:p>
@@ -1417,6 +1629,45 @@
           </a:p>
         </p:txBody>
       </p:sp>
+      <p:pic>
+        <p:nvPicPr>
+          <p:cNvPr id="7" name="Picture 2" descr="https://lh5.googleusercontent.com/ZmJgH0SoqxQJ0LA-v3Rb7WqRt9KO5MW6Z34Oe3WUvt_3nWcLDwQpmnBxjSTv3sQreW90kJou3O_z01RBBIdgyCNf-_rXDm7Ive_nnmIearfz_GCdO9h5BUk63mDr-JE4FVu0qz41"/>
+          <p:cNvPicPr>
+            <a:picLocks noChangeAspect="1" noChangeArrowheads="1"/>
+          </p:cNvPicPr>
+          <p:nvPr userDrawn="1"/>
+        </p:nvPicPr>
+        <p:blipFill rotWithShape="1">
+          <a:blip r:embed="rId2" cstate="print">
+            <a:extLst>
+              <a:ext uri="{28A0092B-C50C-407E-A947-70E740481C1C}">
+                <a14:useLocalDpi xmlns:a14="http://schemas.microsoft.com/office/drawing/2010/main" val="0"/>
+              </a:ext>
+            </a:extLst>
+          </a:blip>
+          <a:srcRect l="247" r="491"/>
+          <a:stretch/>
+        </p:blipFill>
+        <p:spPr bwMode="auto">
+          <a:xfrm>
+            <a:off x="7722759" y="104513"/>
+            <a:ext cx="1239465" cy="450538"/>
+          </a:xfrm>
+          <a:prstGeom prst="rect">
+            <a:avLst/>
+          </a:prstGeom>
+          <a:noFill/>
+          <a:extLst>
+            <a:ext uri="{909E8E84-426E-40DD-AFC4-6F175D3DCCD1}">
+              <a14:hiddenFill xmlns:a14="http://schemas.microsoft.com/office/drawing/2010/main">
+                <a:solidFill>
+                  <a:srgbClr val="FFFFFF"/>
+                </a:solidFill>
+              </a14:hiddenFill>
+            </a:ext>
+          </a:extLst>
+        </p:spPr>
+      </p:pic>
     </p:spTree>
   </p:cSld>
   <p:clrMapOvr>
@@ -3928,8 +4179,8 @@
               <a:defRPr/>
             </a:pPr>
             <a:r>
-              <a:rPr lang="en-US" smtClean="0"/>
-              <a:t>R Dimper – PaNOSC project – LEAPS meeting 13 November 2018 </a:t>
+              <a:rPr lang="en-US" dirty="0" smtClean="0"/>
+              <a:t>Author – Presentation title - date</a:t>
             </a:r>
             <a:endParaRPr lang="fr-FR" dirty="0"/>
           </a:p>
@@ -3972,6 +4223,45 @@
           </a:p>
         </p:txBody>
       </p:sp>
+      <p:pic>
+        <p:nvPicPr>
+          <p:cNvPr id="31" name="Picture 2" descr="https://lh5.googleusercontent.com/ZmJgH0SoqxQJ0LA-v3Rb7WqRt9KO5MW6Z34Oe3WUvt_3nWcLDwQpmnBxjSTv3sQreW90kJou3O_z01RBBIdgyCNf-_rXDm7Ive_nnmIearfz_GCdO9h5BUk63mDr-JE4FVu0qz41"/>
+          <p:cNvPicPr>
+            <a:picLocks noChangeAspect="1" noChangeArrowheads="1"/>
+          </p:cNvPicPr>
+          <p:nvPr userDrawn="1"/>
+        </p:nvPicPr>
+        <p:blipFill rotWithShape="1">
+          <a:blip r:embed="rId2" cstate="print">
+            <a:extLst>
+              <a:ext uri="{28A0092B-C50C-407E-A947-70E740481C1C}">
+                <a14:useLocalDpi xmlns:a14="http://schemas.microsoft.com/office/drawing/2010/main" val="0"/>
+              </a:ext>
+            </a:extLst>
+          </a:blip>
+          <a:srcRect l="247" r="491"/>
+          <a:stretch/>
+        </p:blipFill>
+        <p:spPr bwMode="auto">
+          <a:xfrm>
+            <a:off x="7722759" y="104513"/>
+            <a:ext cx="1239465" cy="450538"/>
+          </a:xfrm>
+          <a:prstGeom prst="rect">
+            <a:avLst/>
+          </a:prstGeom>
+          <a:noFill/>
+          <a:extLst>
+            <a:ext uri="{909E8E84-426E-40DD-AFC4-6F175D3DCCD1}">
+              <a14:hiddenFill xmlns:a14="http://schemas.microsoft.com/office/drawing/2010/main">
+                <a:solidFill>
+                  <a:srgbClr val="FFFFFF"/>
+                </a:solidFill>
+              </a14:hiddenFill>
+            </a:ext>
+          </a:extLst>
+        </p:spPr>
+      </p:pic>
     </p:spTree>
   </p:cSld>
   <p:clrMapOvr>
@@ -4085,41 +4375,86 @@
           <a:p>
             <a:pPr lvl="0"/>
             <a:r>
-              <a:rPr lang="fr-FR" altLang="fr-FR" smtClean="0"/>
-              <a:t>Click to modify attributes</a:t>
+              <a:rPr lang="fr-FR" altLang="fr-FR" dirty="0" smtClean="0"/>
+              <a:t>Click to </a:t>
             </a:r>
+            <a:r>
+              <a:rPr lang="fr-FR" altLang="fr-FR" dirty="0" err="1" smtClean="0"/>
+              <a:t>modify</a:t>
+            </a:r>
+            <a:r>
+              <a:rPr lang="fr-FR" altLang="fr-FR" dirty="0" smtClean="0"/>
+              <a:t> </a:t>
+            </a:r>
+            <a:r>
+              <a:rPr lang="fr-FR" altLang="fr-FR" dirty="0" err="1" smtClean="0"/>
+              <a:t>attributes</a:t>
+            </a:r>
+            <a:endParaRPr lang="fr-FR" altLang="fr-FR" dirty="0" smtClean="0"/>
           </a:p>
           <a:p>
             <a:pPr lvl="1"/>
-            <a:endParaRPr lang="fr-FR" altLang="fr-FR" smtClean="0"/>
+            <a:endParaRPr lang="fr-FR" altLang="fr-FR" dirty="0" smtClean="0"/>
           </a:p>
           <a:p>
             <a:pPr lvl="1"/>
             <a:r>
-              <a:rPr lang="fr-FR" altLang="fr-FR" smtClean="0"/>
-              <a:t>Second level</a:t>
+              <a:rPr lang="fr-FR" altLang="fr-FR" dirty="0" smtClean="0"/>
+              <a:t>Second </a:t>
             </a:r>
+            <a:r>
+              <a:rPr lang="fr-FR" altLang="fr-FR" dirty="0" err="1" smtClean="0"/>
+              <a:t>level</a:t>
+            </a:r>
+            <a:endParaRPr lang="fr-FR" altLang="fr-FR" dirty="0" smtClean="0"/>
           </a:p>
           <a:p>
             <a:pPr lvl="2"/>
             <a:r>
-              <a:rPr lang="fr-FR" altLang="fr-FR" smtClean="0"/>
-              <a:t>Third level</a:t>
+              <a:rPr lang="fr-FR" altLang="fr-FR" dirty="0" err="1" smtClean="0"/>
+              <a:t>Third</a:t>
             </a:r>
+            <a:r>
+              <a:rPr lang="fr-FR" altLang="fr-FR" dirty="0" smtClean="0"/>
+              <a:t> </a:t>
+            </a:r>
+            <a:r>
+              <a:rPr lang="fr-FR" altLang="fr-FR" dirty="0" err="1" smtClean="0"/>
+              <a:t>level</a:t>
+            </a:r>
+            <a:endParaRPr lang="fr-FR" altLang="fr-FR" dirty="0" smtClean="0"/>
           </a:p>
           <a:p>
             <a:pPr lvl="3"/>
             <a:r>
-              <a:rPr lang="fr-FR" altLang="fr-FR" smtClean="0"/>
-              <a:t>Fourth level</a:t>
+              <a:rPr lang="fr-FR" altLang="fr-FR" dirty="0" err="1" smtClean="0"/>
+              <a:t>Fourth</a:t>
             </a:r>
+            <a:r>
+              <a:rPr lang="fr-FR" altLang="fr-FR" dirty="0" smtClean="0"/>
+              <a:t> </a:t>
+            </a:r>
+            <a:r>
+              <a:rPr lang="fr-FR" altLang="fr-FR" dirty="0" err="1" smtClean="0"/>
+              <a:t>level</a:t>
+            </a:r>
+            <a:endParaRPr lang="fr-FR" altLang="fr-FR" dirty="0" smtClean="0"/>
           </a:p>
           <a:p>
             <a:pPr lvl="4"/>
             <a:r>
-              <a:rPr lang="fr-FR" altLang="fr-FR" smtClean="0"/>
-              <a:t>Fifth level</a:t>
+              <a:rPr lang="fr-FR" altLang="fr-FR" dirty="0" err="1" smtClean="0"/>
+              <a:t>Fifth</a:t>
             </a:r>
+            <a:r>
+              <a:rPr lang="fr-FR" altLang="fr-FR" dirty="0" smtClean="0"/>
+              <a:t> </a:t>
+            </a:r>
+            <a:r>
+              <a:rPr lang="fr-FR" altLang="fr-FR" dirty="0" err="1" smtClean="0"/>
+              <a:t>level</a:t>
+            </a:r>
+            <a:endParaRPr lang="fr-FR" altLang="fr-FR" dirty="0" smtClean="0"/>
           </a:p>
         </p:txBody>
       </p:sp>
@@ -4174,8 +4509,8 @@
               <a:defRPr/>
             </a:pPr>
             <a:r>
-              <a:rPr lang="en-US" smtClean="0"/>
-              <a:t>R Dimper – PaNOSC project – LEAPS meeting 13 November 2018 </a:t>
+              <a:rPr lang="en-US" dirty="0" smtClean="0"/>
+              <a:t>Author – Presentation title - date</a:t>
             </a:r>
             <a:endParaRPr lang="fr-FR" dirty="0"/>
           </a:p>
@@ -4286,38 +4621,6 @@
           </a:p>
         </p:txBody>
       </p:sp>
-      <p:pic>
-        <p:nvPicPr>
-          <p:cNvPr id="1032" name="Image 8" descr="logo_texte.jpg"/>
-          <p:cNvPicPr>
-            <a:picLocks noChangeAspect="1"/>
-          </p:cNvPicPr>
-          <p:nvPr/>
-        </p:nvPicPr>
-        <p:blipFill>
-          <a:blip r:embed="rId6" cstate="print"/>
-          <a:srcRect/>
-          <a:stretch>
-            <a:fillRect/>
-          </a:stretch>
-        </p:blipFill>
-        <p:spPr bwMode="auto">
-          <a:xfrm>
-            <a:off x="7380312" y="5175250"/>
-            <a:ext cx="1758926" cy="539750"/>
-          </a:xfrm>
-          <a:prstGeom prst="rect">
-            <a:avLst/>
-          </a:prstGeom>
-          <a:noFill/>
-          <a:ln w="9525">
-            <a:noFill/>
-            <a:miter lim="800000"/>
-            <a:headEnd/>
-            <a:tailEnd/>
-          </a:ln>
-        </p:spPr>
-      </p:pic>
       <p:sp>
         <p:nvSpPr>
           <p:cNvPr id="11" name="Rectangle 10"/>
@@ -4369,6 +4672,243 @@
           </a:p>
         </p:txBody>
       </p:sp>
+      <p:sp>
+        <p:nvSpPr>
+          <p:cNvPr id="9" name="Footer Placeholder 5"/>
+          <p:cNvSpPr txBox="1">
+            <a:spLocks/>
+          </p:cNvSpPr>
+          <p:nvPr userDrawn="1"/>
+        </p:nvSpPr>
+        <p:spPr>
+          <a:xfrm>
+            <a:off x="6156176" y="5233764"/>
+            <a:ext cx="2272448" cy="412873"/>
+          </a:xfrm>
+          <a:prstGeom prst="rect">
+            <a:avLst/>
+          </a:prstGeom>
+          <a:solidFill>
+            <a:schemeClr val="bg1"/>
+          </a:solidFill>
+          <a:ln>
+            <a:miter lim="800000"/>
+            <a:headEnd/>
+            <a:tailEnd/>
+          </a:ln>
+        </p:spPr>
+        <p:txBody>
+          <a:bodyPr wrap="square" numCol="1" compatLnSpc="1">
+            <a:prstTxWarp prst="textNoShape">
+              <a:avLst/>
+            </a:prstTxWarp>
+          </a:bodyPr>
+          <a:lstStyle>
+            <a:defPPr>
+              <a:defRPr lang="fr-FR"/>
+            </a:defPPr>
+            <a:lvl1pPr algn="l" rtl="0" fontAlgn="base">
+              <a:spcBef>
+                <a:spcPct val="0"/>
+              </a:spcBef>
+              <a:spcAft>
+                <a:spcPct val="0"/>
+              </a:spcAft>
+              <a:defRPr kern="1200">
+                <a:solidFill>
+                  <a:schemeClr val="tx1"/>
+                </a:solidFill>
+                <a:latin typeface="Arial" pitchFamily="34" charset="0"/>
+                <a:ea typeface="+mn-ea"/>
+                <a:cs typeface="Arial" pitchFamily="34" charset="0"/>
+              </a:defRPr>
+            </a:lvl1pPr>
+            <a:lvl2pPr marL="405216" algn="l" rtl="0" fontAlgn="base">
+              <a:spcBef>
+                <a:spcPct val="0"/>
+              </a:spcBef>
+              <a:spcAft>
+                <a:spcPct val="0"/>
+              </a:spcAft>
+              <a:defRPr kern="1200">
+                <a:solidFill>
+                  <a:schemeClr val="tx1"/>
+                </a:solidFill>
+                <a:latin typeface="Arial" pitchFamily="34" charset="0"/>
+                <a:ea typeface="+mn-ea"/>
+                <a:cs typeface="Arial" pitchFamily="34" charset="0"/>
+              </a:defRPr>
+            </a:lvl2pPr>
+            <a:lvl3pPr marL="810433" algn="l" rtl="0" fontAlgn="base">
+              <a:spcBef>
+                <a:spcPct val="0"/>
+              </a:spcBef>
+              <a:spcAft>
+                <a:spcPct val="0"/>
+              </a:spcAft>
+              <a:defRPr kern="1200">
+                <a:solidFill>
+                  <a:schemeClr val="tx1"/>
+                </a:solidFill>
+                <a:latin typeface="Arial" pitchFamily="34" charset="0"/>
+                <a:ea typeface="+mn-ea"/>
+                <a:cs typeface="Arial" pitchFamily="34" charset="0"/>
+              </a:defRPr>
+            </a:lvl3pPr>
+            <a:lvl4pPr marL="1215649" algn="l" rtl="0" fontAlgn="base">
+              <a:spcBef>
+                <a:spcPct val="0"/>
+              </a:spcBef>
+              <a:spcAft>
+                <a:spcPct val="0"/>
+              </a:spcAft>
+              <a:defRPr kern="1200">
+                <a:solidFill>
+                  <a:schemeClr val="tx1"/>
+                </a:solidFill>
+                <a:latin typeface="Arial" pitchFamily="34" charset="0"/>
+                <a:ea typeface="+mn-ea"/>
+                <a:cs typeface="Arial" pitchFamily="34" charset="0"/>
+              </a:defRPr>
+            </a:lvl4pPr>
+            <a:lvl5pPr marL="1620865" algn="l" rtl="0" fontAlgn="base">
+              <a:spcBef>
+                <a:spcPct val="0"/>
+              </a:spcBef>
+              <a:spcAft>
+                <a:spcPct val="0"/>
+              </a:spcAft>
+              <a:defRPr kern="1200">
+                <a:solidFill>
+                  <a:schemeClr val="tx1"/>
+                </a:solidFill>
+                <a:latin typeface="Arial" pitchFamily="34" charset="0"/>
+                <a:ea typeface="+mn-ea"/>
+                <a:cs typeface="Arial" pitchFamily="34" charset="0"/>
+              </a:defRPr>
+            </a:lvl5pPr>
+            <a:lvl6pPr marL="2026082" algn="l" defTabSz="810433" rtl="0" eaLnBrk="1" latinLnBrk="0" hangingPunct="1">
+              <a:defRPr kern="1200">
+                <a:solidFill>
+                  <a:schemeClr val="tx1"/>
+                </a:solidFill>
+                <a:latin typeface="Arial" pitchFamily="34" charset="0"/>
+                <a:ea typeface="+mn-ea"/>
+                <a:cs typeface="Arial" pitchFamily="34" charset="0"/>
+              </a:defRPr>
+            </a:lvl6pPr>
+            <a:lvl7pPr marL="2431298" algn="l" defTabSz="810433" rtl="0" eaLnBrk="1" latinLnBrk="0" hangingPunct="1">
+              <a:defRPr kern="1200">
+                <a:solidFill>
+                  <a:schemeClr val="tx1"/>
+                </a:solidFill>
+                <a:latin typeface="Arial" pitchFamily="34" charset="0"/>
+                <a:ea typeface="+mn-ea"/>
+                <a:cs typeface="Arial" pitchFamily="34" charset="0"/>
+              </a:defRPr>
+            </a:lvl7pPr>
+            <a:lvl8pPr marL="2836515" algn="l" defTabSz="810433" rtl="0" eaLnBrk="1" latinLnBrk="0" hangingPunct="1">
+              <a:defRPr kern="1200">
+                <a:solidFill>
+                  <a:schemeClr val="tx1"/>
+                </a:solidFill>
+                <a:latin typeface="Arial" pitchFamily="34" charset="0"/>
+                <a:ea typeface="+mn-ea"/>
+                <a:cs typeface="Arial" pitchFamily="34" charset="0"/>
+              </a:defRPr>
+            </a:lvl8pPr>
+            <a:lvl9pPr marL="3241731" algn="l" defTabSz="810433" rtl="0" eaLnBrk="1" latinLnBrk="0" hangingPunct="1">
+              <a:defRPr kern="1200">
+                <a:solidFill>
+                  <a:schemeClr val="tx1"/>
+                </a:solidFill>
+                <a:latin typeface="Arial" pitchFamily="34" charset="0"/>
+                <a:ea typeface="+mn-ea"/>
+                <a:cs typeface="Arial" pitchFamily="34" charset="0"/>
+              </a:defRPr>
+            </a:lvl9pPr>
+          </a:lstStyle>
+          <a:p>
+            <a:pPr>
+              <a:defRPr/>
+            </a:pPr>
+            <a:r>
+              <a:rPr lang="en-US" sz="700" smtClean="0"/>
+              <a:t>This project has received funding from the European Union's Horizon 2020 research and innovation programme under grant agreement No 823852</a:t>
+            </a:r>
+            <a:endParaRPr lang="fr-FR" sz="700" dirty="0"/>
+          </a:p>
+        </p:txBody>
+      </p:sp>
+      <p:pic>
+        <p:nvPicPr>
+          <p:cNvPr id="10" name="Picture 9"/>
+          <p:cNvPicPr>
+            <a:picLocks noChangeAspect="1"/>
+          </p:cNvPicPr>
+          <p:nvPr userDrawn="1"/>
+        </p:nvPicPr>
+        <p:blipFill>
+          <a:blip r:embed="rId6">
+            <a:extLst>
+              <a:ext uri="{28A0092B-C50C-407E-A947-70E740481C1C}">
+                <a14:useLocalDpi xmlns:a14="http://schemas.microsoft.com/office/drawing/2010/main" val="0"/>
+              </a:ext>
+            </a:extLst>
+          </a:blip>
+          <a:stretch>
+            <a:fillRect/>
+          </a:stretch>
+        </p:blipFill>
+        <p:spPr>
+          <a:xfrm>
+            <a:off x="8428624" y="5233764"/>
+            <a:ext cx="619311" cy="412874"/>
+          </a:xfrm>
+          <a:prstGeom prst="rect">
+            <a:avLst/>
+          </a:prstGeom>
+        </p:spPr>
+      </p:pic>
+      <p:pic>
+        <p:nvPicPr>
+          <p:cNvPr id="13" name="Picture 2" descr="https://lh5.googleusercontent.com/ZmJgH0SoqxQJ0LA-v3Rb7WqRt9KO5MW6Z34Oe3WUvt_3nWcLDwQpmnBxjSTv3sQreW90kJou3O_z01RBBIdgyCNf-_rXDm7Ive_nnmIearfz_GCdO9h5BUk63mDr-JE4FVu0qz41"/>
+          <p:cNvPicPr>
+            <a:picLocks noChangeAspect="1" noChangeArrowheads="1"/>
+          </p:cNvPicPr>
+          <p:nvPr userDrawn="1"/>
+        </p:nvPicPr>
+        <p:blipFill rotWithShape="1">
+          <a:blip r:embed="rId7" cstate="print">
+            <a:extLst>
+              <a:ext uri="{28A0092B-C50C-407E-A947-70E740481C1C}">
+                <a14:useLocalDpi xmlns:a14="http://schemas.microsoft.com/office/drawing/2010/main" val="0"/>
+              </a:ext>
+            </a:extLst>
+          </a:blip>
+          <a:srcRect l="247" r="491"/>
+          <a:stretch/>
+        </p:blipFill>
+        <p:spPr bwMode="auto">
+          <a:xfrm>
+            <a:off x="7722759" y="104513"/>
+            <a:ext cx="1239465" cy="450538"/>
+          </a:xfrm>
+          <a:prstGeom prst="rect">
+            <a:avLst/>
+          </a:prstGeom>
+          <a:noFill/>
+          <a:extLst>
+            <a:ext uri="{909E8E84-426E-40DD-AFC4-6F175D3DCCD1}">
+              <a14:hiddenFill xmlns:a14="http://schemas.microsoft.com/office/drawing/2010/main">
+                <a:solidFill>
+                  <a:srgbClr val="FFFFFF"/>
+                </a:solidFill>
+              </a14:hiddenFill>
+            </a:ext>
+          </a:extLst>
+        </p:spPr>
+      </p:pic>
     </p:spTree>
   </p:cSld>
   <p:clrMap bg1="lt1" tx1="dk1" bg2="lt2" tx2="dk2" accent1="accent1" accent2="accent2" accent3="accent3" accent4="accent4" accent5="accent5" accent6="accent6" hlink="hlink" folHlink="folHlink"/>
@@ -4955,8 +5495,8 @@
         </p:nvSpPr>
         <p:spPr>
           <a:xfrm>
-            <a:off x="727075" y="104513"/>
-            <a:ext cx="8165405" cy="414073"/>
+            <a:off x="727075" y="99527"/>
+            <a:ext cx="8320860" cy="525725"/>
           </a:xfrm>
         </p:spPr>
         <p:txBody>
@@ -6517,4 +7057,265 @@
   <a:objectDefaults/>
   <a:extraClrSchemeLst/>
 </a:theme>
+</file>
+
+<file path=ppt/theme/theme3.xml><?xml version="1.0" encoding="utf-8"?>
+<a:theme xmlns:a="http://schemas.openxmlformats.org/drawingml/2006/main" name="Office Theme">
+  <a:themeElements>
+    <a:clrScheme name="Office">
+      <a:dk1>
+        <a:sysClr val="windowText" lastClr="000000"/>
+      </a:dk1>
+      <a:lt1>
+        <a:sysClr val="window" lastClr="FFFFFF"/>
+      </a:lt1>
+      <a:dk2>
+        <a:srgbClr val="44546A"/>
+      </a:dk2>
+      <a:lt2>
+        <a:srgbClr val="E7E6E6"/>
+      </a:lt2>
+      <a:accent1>
+        <a:srgbClr val="5B9BD5"/>
+      </a:accent1>
+      <a:accent2>
+        <a:srgbClr val="ED7D31"/>
+      </a:accent2>
+      <a:accent3>
+        <a:srgbClr val="A5A5A5"/>
+      </a:accent3>
+      <a:accent4>
+        <a:srgbClr val="FFC000"/>
+      </a:accent4>
+      <a:accent5>
+        <a:srgbClr val="4472C4"/>
+      </a:accent5>
+      <a:accent6>
+        <a:srgbClr val="70AD47"/>
+      </a:accent6>
+      <a:hlink>
+        <a:srgbClr val="0563C1"/>
+      </a:hlink>
+      <a:folHlink>
+        <a:srgbClr val="954F72"/>
+      </a:folHlink>
+    </a:clrScheme>
+    <a:fontScheme name="Office">
+      <a:majorFont>
+        <a:latin typeface="Calibri Light" panose="020F0302020204030204"/>
+        <a:ea typeface=""/>
+        <a:cs typeface=""/>
+        <a:font script="Jpan" typeface="ＭＳ Ｐゴシック"/>
+        <a:font script="Hang" typeface="맑은 고딕"/>
+        <a:font script="Hans" typeface="宋体"/>
+        <a:font script="Hant" typeface="新細明體"/>
+        <a:font script="Arab" typeface="Times New Roman"/>
+        <a:font script="Hebr" typeface="Times New Roman"/>
+        <a:font script="Thai" typeface="Angsana New"/>
+        <a:font script="Ethi" typeface="Nyala"/>
+        <a:font script="Beng" typeface="Vrinda"/>
+        <a:font script="Gujr" typeface="Shruti"/>
+        <a:font script="Khmr" typeface="MoolBoran"/>
+        <a:font script="Knda" typeface="Tunga"/>
+        <a:font script="Guru" typeface="Raavi"/>
+        <a:font script="Cans" typeface="Euphemia"/>
+        <a:font script="Cher" typeface="Plantagenet Cherokee"/>
+        <a:font script="Yiii" typeface="Microsoft Yi Baiti"/>
+        <a:font script="Tibt" typeface="Microsoft Himalaya"/>
+        <a:font script="Thaa" typeface="MV Boli"/>
+        <a:font script="Deva" typeface="Mangal"/>
+        <a:font script="Telu" typeface="Gautami"/>
+        <a:font script="Taml" typeface="Latha"/>
+        <a:font script="Syrc" typeface="Estrangelo Edessa"/>
+        <a:font script="Orya" typeface="Kalinga"/>
+        <a:font script="Mlym" typeface="Kartika"/>
+        <a:font script="Laoo" typeface="DokChampa"/>
+        <a:font script="Sinh" typeface="Iskoola Pota"/>
+        <a:font script="Mong" typeface="Mongolian Baiti"/>
+        <a:font script="Viet" typeface="Times New Roman"/>
+        <a:font script="Uigh" typeface="Microsoft Uighur"/>
+        <a:font script="Geor" typeface="Sylfaen"/>
+      </a:majorFont>
+      <a:minorFont>
+        <a:latin typeface="Calibri" panose="020F0502020204030204"/>
+        <a:ea typeface=""/>
+        <a:cs typeface=""/>
+        <a:font script="Jpan" typeface="ＭＳ Ｐゴシック"/>
+        <a:font script="Hang" typeface="맑은 고딕"/>
+        <a:font script="Hans" typeface="宋体"/>
+        <a:font script="Hant" typeface="新細明體"/>
+        <a:font script="Arab" typeface="Arial"/>
+        <a:font script="Hebr" typeface="Arial"/>
+        <a:font script="Thai" typeface="Cordia New"/>
+        <a:font script="Ethi" typeface="Nyala"/>
+        <a:font script="Beng" typeface="Vrinda"/>
+        <a:font script="Gujr" typeface="Shruti"/>
+        <a:font script="Khmr" typeface="DaunPenh"/>
+        <a:font script="Knda" typeface="Tunga"/>
+        <a:font script="Guru" typeface="Raavi"/>
+        <a:font script="Cans" typeface="Euphemia"/>
+        <a:font script="Cher" typeface="Plantagenet Cherokee"/>
+        <a:font script="Yiii" typeface="Microsoft Yi Baiti"/>
+        <a:font script="Tibt" typeface="Microsoft Himalaya"/>
+        <a:font script="Thaa" typeface="MV Boli"/>
+        <a:font script="Deva" typeface="Mangal"/>
+        <a:font script="Telu" typeface="Gautami"/>
+        <a:font script="Taml" typeface="Latha"/>
+        <a:font script="Syrc" typeface="Estrangelo Edessa"/>
+        <a:font script="Orya" typeface="Kalinga"/>
+        <a:font script="Mlym" typeface="Kartika"/>
+        <a:font script="Laoo" typeface="DokChampa"/>
+        <a:font script="Sinh" typeface="Iskoola Pota"/>
+        <a:font script="Mong" typeface="Mongolian Baiti"/>
+        <a:font script="Viet" typeface="Arial"/>
+        <a:font script="Uigh" typeface="Microsoft Uighur"/>
+        <a:font script="Geor" typeface="Sylfaen"/>
+      </a:minorFont>
+    </a:fontScheme>
+    <a:fmtScheme name="Office">
+      <a:fillStyleLst>
+        <a:solidFill>
+          <a:schemeClr val="phClr"/>
+        </a:solidFill>
+        <a:gradFill rotWithShape="1">
+          <a:gsLst>
+            <a:gs pos="0">
+              <a:schemeClr val="phClr">
+                <a:lumMod val="110000"/>
+                <a:satMod val="105000"/>
+                <a:tint val="67000"/>
+              </a:schemeClr>
+            </a:gs>
+            <a:gs pos="50000">
+              <a:schemeClr val="phClr">
+                <a:lumMod val="105000"/>
+                <a:satMod val="103000"/>
+                <a:tint val="73000"/>
+              </a:schemeClr>
+            </a:gs>
+            <a:gs pos="100000">
+              <a:schemeClr val="phClr">
+                <a:lumMod val="105000"/>
+                <a:satMod val="109000"/>
+                <a:tint val="81000"/>
+              </a:schemeClr>
+            </a:gs>
+          </a:gsLst>
+          <a:lin ang="5400000" scaled="0"/>
+        </a:gradFill>
+        <a:gradFill rotWithShape="1">
+          <a:gsLst>
+            <a:gs pos="0">
+              <a:schemeClr val="phClr">
+                <a:satMod val="103000"/>
+                <a:lumMod val="102000"/>
+                <a:tint val="94000"/>
+              </a:schemeClr>
+            </a:gs>
+            <a:gs pos="50000">
+              <a:schemeClr val="phClr">
+                <a:satMod val="110000"/>
+                <a:lumMod val="100000"/>
+                <a:shade val="100000"/>
+              </a:schemeClr>
+            </a:gs>
+            <a:gs pos="100000">
+              <a:schemeClr val="phClr">
+                <a:lumMod val="99000"/>
+                <a:satMod val="120000"/>
+                <a:shade val="78000"/>
+              </a:schemeClr>
+            </a:gs>
+          </a:gsLst>
+          <a:lin ang="5400000" scaled="0"/>
+        </a:gradFill>
+      </a:fillStyleLst>
+      <a:lnStyleLst>
+        <a:ln w="6350" cap="flat" cmpd="sng" algn="ctr">
+          <a:solidFill>
+            <a:schemeClr val="phClr"/>
+          </a:solidFill>
+          <a:prstDash val="solid"/>
+          <a:miter lim="800000"/>
+        </a:ln>
+        <a:ln w="12700" cap="flat" cmpd="sng" algn="ctr">
+          <a:solidFill>
+            <a:schemeClr val="phClr"/>
+          </a:solidFill>
+          <a:prstDash val="solid"/>
+          <a:miter lim="800000"/>
+        </a:ln>
+        <a:ln w="19050" cap="flat" cmpd="sng" algn="ctr">
+          <a:solidFill>
+            <a:schemeClr val="phClr"/>
+          </a:solidFill>
+          <a:prstDash val="solid"/>
+          <a:miter lim="800000"/>
+        </a:ln>
+      </a:lnStyleLst>
+      <a:effectStyleLst>
+        <a:effectStyle>
+          <a:effectLst/>
+        </a:effectStyle>
+        <a:effectStyle>
+          <a:effectLst/>
+        </a:effectStyle>
+        <a:effectStyle>
+          <a:effectLst>
+            <a:outerShdw blurRad="57150" dist="19050" dir="5400000" algn="ctr" rotWithShape="0">
+              <a:srgbClr val="000000">
+                <a:alpha val="63000"/>
+              </a:srgbClr>
+            </a:outerShdw>
+          </a:effectLst>
+        </a:effectStyle>
+      </a:effectStyleLst>
+      <a:bgFillStyleLst>
+        <a:solidFill>
+          <a:schemeClr val="phClr"/>
+        </a:solidFill>
+        <a:solidFill>
+          <a:schemeClr val="phClr">
+            <a:tint val="95000"/>
+            <a:satMod val="170000"/>
+          </a:schemeClr>
+        </a:solidFill>
+        <a:gradFill rotWithShape="1">
+          <a:gsLst>
+            <a:gs pos="0">
+              <a:schemeClr val="phClr">
+                <a:tint val="93000"/>
+                <a:satMod val="150000"/>
+                <a:shade val="98000"/>
+                <a:lumMod val="102000"/>
+              </a:schemeClr>
+            </a:gs>
+            <a:gs pos="50000">
+              <a:schemeClr val="phClr">
+                <a:tint val="98000"/>
+                <a:satMod val="130000"/>
+                <a:shade val="90000"/>
+                <a:lumMod val="103000"/>
+              </a:schemeClr>
+            </a:gs>
+            <a:gs pos="100000">
+              <a:schemeClr val="phClr">
+                <a:shade val="63000"/>
+                <a:satMod val="120000"/>
+              </a:schemeClr>
+            </a:gs>
+          </a:gsLst>
+          <a:lin ang="5400000" scaled="0"/>
+        </a:gradFill>
+      </a:bgFillStyleLst>
+    </a:fmtScheme>
+  </a:themeElements>
+  <a:objectDefaults/>
+  <a:extraClrSchemeLst/>
+  <a:extLst>
+    <a:ext uri="{05A4C25C-085E-4340-85A3-A5531E510DB2}">
+      <thm15:themeFamily xmlns:thm15="http://schemas.microsoft.com/office/thememl/2012/main" name="Office Theme" id="{62F939B6-93AF-4DB8-9C6B-D6C7DFDC589F}" vid="{4A3C46E8-61CC-4603-A589-7422A47A8E4A}"/>
+    </a:ext>
+  </a:extLst>
+</a:theme>
 </file>
</xml_diff>